<commit_message>
Added poster and slides
</commit_message>
<xml_diff>
--- a/Polygonal Data Clusters and LIME.pptx
+++ b/Polygonal Data Clusters and LIME.pptx
@@ -6423,6 +6423,51 @@
                       </p:childTnLst>
                     </p:cTn>
                   </p:par>
+                  <p:par>
+                    <p:cTn id="17" fill="hold">
+                      <p:stCondLst>
+                        <p:cond delay="indefinite"/>
+                      </p:stCondLst>
+                      <p:childTnLst>
+                        <p:par>
+                          <p:cTn id="18" fill="hold">
+                            <p:stCondLst>
+                              <p:cond delay="0"/>
+                            </p:stCondLst>
+                            <p:childTnLst>
+                              <p:par>
+                                <p:cTn id="19" presetID="1" presetClass="entr" presetSubtype="0" fill="hold" nodeType="clickEffect">
+                                  <p:stCondLst>
+                                    <p:cond delay="0"/>
+                                  </p:stCondLst>
+                                  <p:childTnLst>
+                                    <p:set>
+                                      <p:cBhvr>
+                                        <p:cTn id="20" dur="1" fill="hold">
+                                          <p:stCondLst>
+                                            <p:cond delay="0"/>
+                                          </p:stCondLst>
+                                        </p:cTn>
+                                        <p:tgtEl>
+                                          <p:spTgt spid="11"/>
+                                        </p:tgtEl>
+                                        <p:attrNameLst>
+                                          <p:attrName>style.visibility</p:attrName>
+                                        </p:attrNameLst>
+                                      </p:cBhvr>
+                                      <p:to>
+                                        <p:strVal val="visible"/>
+                                      </p:to>
+                                    </p:set>
+                                  </p:childTnLst>
+                                </p:cTn>
+                              </p:par>
+                            </p:childTnLst>
+                          </p:cTn>
+                        </p:par>
+                      </p:childTnLst>
+                    </p:cTn>
+                  </p:par>
                 </p:childTnLst>
               </p:cTn>
               <p:prevCondLst>
@@ -12284,6 +12329,51 @@
                       </p:childTnLst>
                     </p:cTn>
                   </p:par>
+                  <p:par>
+                    <p:cTn id="17" fill="hold">
+                      <p:stCondLst>
+                        <p:cond delay="indefinite"/>
+                      </p:stCondLst>
+                      <p:childTnLst>
+                        <p:par>
+                          <p:cTn id="18" fill="hold">
+                            <p:stCondLst>
+                              <p:cond delay="0"/>
+                            </p:stCondLst>
+                            <p:childTnLst>
+                              <p:par>
+                                <p:cTn id="19" presetID="1" presetClass="entr" presetSubtype="0" fill="hold" nodeType="clickEffect">
+                                  <p:stCondLst>
+                                    <p:cond delay="0"/>
+                                  </p:stCondLst>
+                                  <p:childTnLst>
+                                    <p:set>
+                                      <p:cBhvr>
+                                        <p:cTn id="20" dur="1" fill="hold">
+                                          <p:stCondLst>
+                                            <p:cond delay="0"/>
+                                          </p:stCondLst>
+                                        </p:cTn>
+                                        <p:tgtEl>
+                                          <p:spTgt spid="11"/>
+                                        </p:tgtEl>
+                                        <p:attrNameLst>
+                                          <p:attrName>style.visibility</p:attrName>
+                                        </p:attrNameLst>
+                                      </p:cBhvr>
+                                      <p:to>
+                                        <p:strVal val="visible"/>
+                                      </p:to>
+                                    </p:set>
+                                  </p:childTnLst>
+                                </p:cTn>
+                              </p:par>
+                            </p:childTnLst>
+                          </p:cTn>
+                        </p:par>
+                      </p:childTnLst>
+                    </p:cTn>
+                  </p:par>
                 </p:childTnLst>
               </p:cTn>
               <p:prevCondLst>

</xml_diff>